<commit_message>
Changes per registry revieew feedback
</commit_message>
<xml_diff>
--- a/specifications/diagrams/TDW-DID Method Spaces 0.9.pptx
+++ b/specifications/diagrams/TDW-DID Method Spaces 0.9.pptx
@@ -6,6 +6,7 @@
   </p:sldMasterIdLst>
   <p:sldIdLst>
     <p:sldId id="256" r:id="rId2"/>
+    <p:sldId id="257" r:id="rId3"/>
   </p:sldIdLst>
   <p:sldSz cx="14630400" cy="6858000"/>
   <p:notesSz cx="6858000" cy="9144000"/>
@@ -243,7 +244,7 @@
           <a:p>
             <a:fld id="{FFFEF5D7-1469-4E74-9570-816BA0D29F90}" type="datetimeFigureOut">
               <a:rPr lang="en-US" smtClean="0"/>
-              <a:t>1/15/2022</a:t>
+              <a:t>1/23/2022</a:t>
             </a:fld>
             <a:endParaRPr lang="en-US" dirty="0"/>
           </a:p>
@@ -413,7 +414,7 @@
           <a:p>
             <a:fld id="{FFFEF5D7-1469-4E74-9570-816BA0D29F90}" type="datetimeFigureOut">
               <a:rPr lang="en-US" smtClean="0"/>
-              <a:t>1/15/2022</a:t>
+              <a:t>1/23/2022</a:t>
             </a:fld>
             <a:endParaRPr lang="en-US" dirty="0"/>
           </a:p>
@@ -593,7 +594,7 @@
           <a:p>
             <a:fld id="{FFFEF5D7-1469-4E74-9570-816BA0D29F90}" type="datetimeFigureOut">
               <a:rPr lang="en-US" smtClean="0"/>
-              <a:t>1/15/2022</a:t>
+              <a:t>1/23/2022</a:t>
             </a:fld>
             <a:endParaRPr lang="en-US" dirty="0"/>
           </a:p>
@@ -763,7 +764,7 @@
           <a:p>
             <a:fld id="{FFFEF5D7-1469-4E74-9570-816BA0D29F90}" type="datetimeFigureOut">
               <a:rPr lang="en-US" smtClean="0"/>
-              <a:t>1/15/2022</a:t>
+              <a:t>1/23/2022</a:t>
             </a:fld>
             <a:endParaRPr lang="en-US" dirty="0"/>
           </a:p>
@@ -1009,7 +1010,7 @@
           <a:p>
             <a:fld id="{FFFEF5D7-1469-4E74-9570-816BA0D29F90}" type="datetimeFigureOut">
               <a:rPr lang="en-US" smtClean="0"/>
-              <a:t>1/15/2022</a:t>
+              <a:t>1/23/2022</a:t>
             </a:fld>
             <a:endParaRPr lang="en-US" dirty="0"/>
           </a:p>
@@ -1241,7 +1242,7 @@
           <a:p>
             <a:fld id="{FFFEF5D7-1469-4E74-9570-816BA0D29F90}" type="datetimeFigureOut">
               <a:rPr lang="en-US" smtClean="0"/>
-              <a:t>1/15/2022</a:t>
+              <a:t>1/23/2022</a:t>
             </a:fld>
             <a:endParaRPr lang="en-US" dirty="0"/>
           </a:p>
@@ -1608,7 +1609,7 @@
           <a:p>
             <a:fld id="{FFFEF5D7-1469-4E74-9570-816BA0D29F90}" type="datetimeFigureOut">
               <a:rPr lang="en-US" smtClean="0"/>
-              <a:t>1/15/2022</a:t>
+              <a:t>1/23/2022</a:t>
             </a:fld>
             <a:endParaRPr lang="en-US" dirty="0"/>
           </a:p>
@@ -1726,7 +1727,7 @@
           <a:p>
             <a:fld id="{FFFEF5D7-1469-4E74-9570-816BA0D29F90}" type="datetimeFigureOut">
               <a:rPr lang="en-US" smtClean="0"/>
-              <a:t>1/15/2022</a:t>
+              <a:t>1/23/2022</a:t>
             </a:fld>
             <a:endParaRPr lang="en-US" dirty="0"/>
           </a:p>
@@ -1821,7 +1822,7 @@
           <a:p>
             <a:fld id="{FFFEF5D7-1469-4E74-9570-816BA0D29F90}" type="datetimeFigureOut">
               <a:rPr lang="en-US" smtClean="0"/>
-              <a:t>1/15/2022</a:t>
+              <a:t>1/23/2022</a:t>
             </a:fld>
             <a:endParaRPr lang="en-US" dirty="0"/>
           </a:p>
@@ -2098,7 +2099,7 @@
           <a:p>
             <a:fld id="{FFFEF5D7-1469-4E74-9570-816BA0D29F90}" type="datetimeFigureOut">
               <a:rPr lang="en-US" smtClean="0"/>
-              <a:t>1/15/2022</a:t>
+              <a:t>1/23/2022</a:t>
             </a:fld>
             <a:endParaRPr lang="en-US" dirty="0"/>
           </a:p>
@@ -2354,7 +2355,7 @@
           <a:p>
             <a:fld id="{FFFEF5D7-1469-4E74-9570-816BA0D29F90}" type="datetimeFigureOut">
               <a:rPr lang="en-US" smtClean="0"/>
-              <a:t>1/15/2022</a:t>
+              <a:t>1/23/2022</a:t>
             </a:fld>
             <a:endParaRPr lang="en-US" dirty="0"/>
           </a:p>
@@ -2567,7 +2568,7 @@
           <a:p>
             <a:fld id="{FFFEF5D7-1469-4E74-9570-816BA0D29F90}" type="datetimeFigureOut">
               <a:rPr lang="en-US" smtClean="0"/>
-              <a:t>1/15/2022</a:t>
+              <a:t>1/23/2022</a:t>
             </a:fld>
             <a:endParaRPr lang="en-US" dirty="0"/>
           </a:p>
@@ -4841,15 +4842,7 @@
             <a:pPr algn="l"/>
             <a:r>
               <a:rPr lang="en-US" sz="2400" dirty="0"/>
-              <a:t>Trusted Digital Web and the Decentralized (DID) OSI </a:t>
-            </a:r>
-            <a:r>
-              <a:rPr lang="en-US" sz="2400"/>
-              <a:t>Model 0.9 </a:t>
-            </a:r>
-            <a:r>
-              <a:rPr lang="en-US" sz="2400" dirty="0"/>
-              <a:t>– January 15, 2022</a:t>
+              <a:t>Trusted Digital Web and the Decentralized (DID) OSI Model 0.9 – January 15, 2022</a:t>
             </a:r>
           </a:p>
         </p:txBody>
@@ -4858,6 +4851,509 @@
     <p:extLst>
       <p:ext uri="{BB962C8B-B14F-4D97-AF65-F5344CB8AC3E}">
         <p14:creationId xmlns:p14="http://schemas.microsoft.com/office/powerpoint/2010/main" val="4168250140"/>
+      </p:ext>
+    </p:extLst>
+  </p:cSld>
+  <p:clrMapOvr>
+    <a:masterClrMapping/>
+  </p:clrMapOvr>
+</p:sld>
+</file>
+
+<file path=ppt/slides/slide2.xml><?xml version="1.0" encoding="utf-8"?>
+<p:sld xmlns:a="http://schemas.openxmlformats.org/drawingml/2006/main" xmlns:r="http://schemas.openxmlformats.org/officeDocument/2006/relationships" xmlns:p="http://schemas.openxmlformats.org/presentationml/2006/main">
+  <p:cSld>
+    <p:spTree>
+      <p:nvGrpSpPr>
+        <p:cNvPr id="1" name=""/>
+        <p:cNvGrpSpPr/>
+        <p:nvPr/>
+      </p:nvGrpSpPr>
+      <p:grpSpPr>
+        <a:xfrm>
+          <a:off x="0" y="0"/>
+          <a:ext cx="0" cy="0"/>
+          <a:chOff x="0" y="0"/>
+          <a:chExt cx="0" cy="0"/>
+        </a:xfrm>
+      </p:grpSpPr>
+      <p:graphicFrame>
+        <p:nvGraphicFramePr>
+          <p:cNvPr id="4" name="Table 4">
+            <a:extLst>
+              <a:ext uri="{FF2B5EF4-FFF2-40B4-BE49-F238E27FC236}">
+                <a16:creationId xmlns:a16="http://schemas.microsoft.com/office/drawing/2014/main" id="{478249B8-7D25-4AA9-80BB-397F76DBF16F}"/>
+              </a:ext>
+            </a:extLst>
+          </p:cNvPr>
+          <p:cNvGraphicFramePr>
+            <a:graphicFrameLocks noGrp="1"/>
+          </p:cNvGraphicFramePr>
+          <p:nvPr>
+            <p:ph idx="4294967295"/>
+            <p:extLst>
+              <p:ext uri="{D42A27DB-BD31-4B8C-83A1-F6EECF244321}">
+                <p14:modId xmlns:p14="http://schemas.microsoft.com/office/powerpoint/2010/main" val="2868169413"/>
+              </p:ext>
+            </p:extLst>
+          </p:nvPr>
+        </p:nvGraphicFramePr>
+        <p:xfrm>
+          <a:off x="914400" y="1611616"/>
+          <a:ext cx="12801601" cy="2966720"/>
+        </p:xfrm>
+        <a:graphic>
+          <a:graphicData uri="http://schemas.openxmlformats.org/drawingml/2006/table">
+            <a:tbl>
+              <a:tblPr firstRow="1" bandRow="1">
+                <a:tableStyleId>{5C22544A-7EE6-4342-B048-85BDC9FD1C3A}</a:tableStyleId>
+              </a:tblPr>
+              <a:tblGrid>
+                <a:gridCol w="4545309">
+                  <a:extLst>
+                    <a:ext uri="{9D8B030D-6E8A-4147-A177-3AD203B41FA5}">
+                      <a16:colId xmlns:a16="http://schemas.microsoft.com/office/drawing/2014/main" val="2593445918"/>
+                    </a:ext>
+                  </a:extLst>
+                </a:gridCol>
+                <a:gridCol w="2390512">
+                  <a:extLst>
+                    <a:ext uri="{9D8B030D-6E8A-4147-A177-3AD203B41FA5}">
+                      <a16:colId xmlns:a16="http://schemas.microsoft.com/office/drawing/2014/main" val="2025978299"/>
+                    </a:ext>
+                  </a:extLst>
+                </a:gridCol>
+                <a:gridCol w="5865780">
+                  <a:extLst>
+                    <a:ext uri="{9D8B030D-6E8A-4147-A177-3AD203B41FA5}">
+                      <a16:colId xmlns:a16="http://schemas.microsoft.com/office/drawing/2014/main" val="1919832072"/>
+                    </a:ext>
+                  </a:extLst>
+                </a:gridCol>
+              </a:tblGrid>
+              <a:tr h="370840">
+                <a:tc>
+                  <a:txBody>
+                    <a:bodyPr/>
+                    <a:lstStyle/>
+                    <a:p>
+                      <a:pPr algn="ctr"/>
+                      <a:r>
+                        <a:rPr lang="en-US" dirty="0"/>
+                        <a:t>Unit</a:t>
+                      </a:r>
+                    </a:p>
+                  </a:txBody>
+                  <a:tcPr/>
+                </a:tc>
+                <a:tc>
+                  <a:txBody>
+                    <a:bodyPr/>
+                    <a:lstStyle/>
+                    <a:p>
+                      <a:pPr algn="ctr"/>
+                      <a:r>
+                        <a:rPr lang="en-US" dirty="0"/>
+                        <a:t>Dwelling</a:t>
+                      </a:r>
+                    </a:p>
+                  </a:txBody>
+                  <a:tcPr/>
+                </a:tc>
+                <a:tc>
+                  <a:txBody>
+                    <a:bodyPr/>
+                    <a:lstStyle/>
+                    <a:p>
+                      <a:pPr algn="ctr"/>
+                      <a:r>
+                        <a:rPr lang="en-US" dirty="0"/>
+                        <a:t>Characteristic Information Scope</a:t>
+                      </a:r>
+                    </a:p>
+                  </a:txBody>
+                  <a:tcPr/>
+                </a:tc>
+                <a:extLst>
+                  <a:ext uri="{0D108BD9-81ED-4DB2-BD59-A6C34878D82A}">
+                    <a16:rowId xmlns:a16="http://schemas.microsoft.com/office/drawing/2014/main" val="68612835"/>
+                  </a:ext>
+                </a:extLst>
+              </a:tr>
+              <a:tr h="370840">
+                <a:tc>
+                  <a:txBody>
+                    <a:bodyPr/>
+                    <a:lstStyle/>
+                    <a:p>
+                      <a:pPr marL="0" indent="0">
+                        <a:buNone/>
+                      </a:pPr>
+                      <a:r>
+                        <a:rPr lang="en-US" dirty="0"/>
+                        <a:t>1. Wanderer, Individual, Contributor</a:t>
+                      </a:r>
+                    </a:p>
+                  </a:txBody>
+                  <a:tcPr/>
+                </a:tc>
+                <a:tc>
+                  <a:txBody>
+                    <a:bodyPr/>
+                    <a:lstStyle/>
+                    <a:p>
+                      <a:r>
+                        <a:rPr lang="en-US" dirty="0"/>
+                        <a:t>Tent</a:t>
+                      </a:r>
+                    </a:p>
+                  </a:txBody>
+                  <a:tcPr/>
+                </a:tc>
+                <a:tc>
+                  <a:txBody>
+                    <a:bodyPr/>
+                    <a:lstStyle/>
+                    <a:p>
+                      <a:r>
+                        <a:rPr lang="en-US" dirty="0"/>
+                        <a:t>Personal Thoughts &amp; Memories, Maps, Sketches</a:t>
+                      </a:r>
+                    </a:p>
+                  </a:txBody>
+                  <a:tcPr/>
+                </a:tc>
+                <a:extLst>
+                  <a:ext uri="{0D108BD9-81ED-4DB2-BD59-A6C34878D82A}">
+                    <a16:rowId xmlns:a16="http://schemas.microsoft.com/office/drawing/2014/main" val="4020861338"/>
+                  </a:ext>
+                </a:extLst>
+              </a:tr>
+              <a:tr h="370840">
+                <a:tc>
+                  <a:txBody>
+                    <a:bodyPr/>
+                    <a:lstStyle/>
+                    <a:p>
+                      <a:r>
+                        <a:rPr lang="en-US" dirty="0"/>
+                        <a:t>2. Party of Explorers, Group, Team</a:t>
+                      </a:r>
+                    </a:p>
+                  </a:txBody>
+                  <a:tcPr/>
+                </a:tc>
+                <a:tc>
+                  <a:txBody>
+                    <a:bodyPr/>
+                    <a:lstStyle/>
+                    <a:p>
+                      <a:r>
+                        <a:rPr lang="en-US" dirty="0"/>
+                        <a:t>Camp</a:t>
+                      </a:r>
+                    </a:p>
+                  </a:txBody>
+                  <a:tcPr/>
+                </a:tc>
+                <a:tc>
+                  <a:txBody>
+                    <a:bodyPr/>
+                    <a:lstStyle/>
+                    <a:p>
+                      <a:r>
+                        <a:rPr lang="en-US" dirty="0"/>
+                        <a:t>Oral History, Water Cooler Conversations</a:t>
+                      </a:r>
+                    </a:p>
+                  </a:txBody>
+                  <a:tcPr/>
+                </a:tc>
+                <a:extLst>
+                  <a:ext uri="{0D108BD9-81ED-4DB2-BD59-A6C34878D82A}">
+                    <a16:rowId xmlns:a16="http://schemas.microsoft.com/office/drawing/2014/main" val="3156746087"/>
+                  </a:ext>
+                </a:extLst>
+              </a:tr>
+              <a:tr h="370840">
+                <a:tc>
+                  <a:txBody>
+                    <a:bodyPr/>
+                    <a:lstStyle/>
+                    <a:p>
+                      <a:r>
+                        <a:rPr lang="en-US" dirty="0"/>
+                        <a:t>3. Family Unit, Clan, Department</a:t>
+                      </a:r>
+                    </a:p>
+                  </a:txBody>
+                  <a:tcPr/>
+                </a:tc>
+                <a:tc>
+                  <a:txBody>
+                    <a:bodyPr/>
+                    <a:lstStyle/>
+                    <a:p>
+                      <a:r>
+                        <a:rPr lang="en-US" dirty="0"/>
+                        <a:t>Homestead</a:t>
+                      </a:r>
+                    </a:p>
+                  </a:txBody>
+                  <a:tcPr/>
+                </a:tc>
+                <a:tc>
+                  <a:txBody>
+                    <a:bodyPr/>
+                    <a:lstStyle/>
+                    <a:p>
+                      <a:r>
+                        <a:rPr lang="en-US" dirty="0"/>
+                        <a:t>Family History, Household Knowledge</a:t>
+                      </a:r>
+                    </a:p>
+                  </a:txBody>
+                  <a:tcPr/>
+                </a:tc>
+                <a:extLst>
+                  <a:ext uri="{0D108BD9-81ED-4DB2-BD59-A6C34878D82A}">
+                    <a16:rowId xmlns:a16="http://schemas.microsoft.com/office/drawing/2014/main" val="3502995601"/>
+                  </a:ext>
+                </a:extLst>
+              </a:tr>
+              <a:tr h="370840">
+                <a:tc>
+                  <a:txBody>
+                    <a:bodyPr/>
+                    <a:lstStyle/>
+                    <a:p>
+                      <a:r>
+                        <a:rPr lang="en-US" dirty="0"/>
+                        <a:t>4. Band, Community, Division</a:t>
+                      </a:r>
+                    </a:p>
+                  </a:txBody>
+                  <a:tcPr/>
+                </a:tc>
+                <a:tc>
+                  <a:txBody>
+                    <a:bodyPr/>
+                    <a:lstStyle/>
+                    <a:p>
+                      <a:r>
+                        <a:rPr lang="en-US" dirty="0"/>
+                        <a:t>Village</a:t>
+                      </a:r>
+                    </a:p>
+                  </a:txBody>
+                  <a:tcPr/>
+                </a:tc>
+                <a:tc>
+                  <a:txBody>
+                    <a:bodyPr/>
+                    <a:lstStyle/>
+                    <a:p>
+                      <a:r>
+                        <a:rPr lang="en-US" dirty="0"/>
+                        <a:t>Communal Knowledge, Collective Knowledge</a:t>
+                      </a:r>
+                    </a:p>
+                  </a:txBody>
+                  <a:tcPr/>
+                </a:tc>
+                <a:extLst>
+                  <a:ext uri="{0D108BD9-81ED-4DB2-BD59-A6C34878D82A}">
+                    <a16:rowId xmlns:a16="http://schemas.microsoft.com/office/drawing/2014/main" val="2818152800"/>
+                  </a:ext>
+                </a:extLst>
+              </a:tr>
+              <a:tr h="370840">
+                <a:tc>
+                  <a:txBody>
+                    <a:bodyPr/>
+                    <a:lstStyle/>
+                    <a:p>
+                      <a:r>
+                        <a:rPr lang="en-US" dirty="0"/>
+                        <a:t>5. Tribe, Society, Company</a:t>
+                      </a:r>
+                    </a:p>
+                  </a:txBody>
+                  <a:tcPr/>
+                </a:tc>
+                <a:tc>
+                  <a:txBody>
+                    <a:bodyPr/>
+                    <a:lstStyle/>
+                    <a:p>
+                      <a:r>
+                        <a:rPr lang="en-US" dirty="0"/>
+                        <a:t>Territory</a:t>
+                      </a:r>
+                    </a:p>
+                  </a:txBody>
+                  <a:tcPr/>
+                </a:tc>
+                <a:tc>
+                  <a:txBody>
+                    <a:bodyPr/>
+                    <a:lstStyle/>
+                    <a:p>
+                      <a:r>
+                        <a:rPr lang="en-US" dirty="0"/>
+                        <a:t>Tribal Knowledge, Institutional Knowledge</a:t>
+                      </a:r>
+                    </a:p>
+                  </a:txBody>
+                  <a:tcPr/>
+                </a:tc>
+                <a:extLst>
+                  <a:ext uri="{0D108BD9-81ED-4DB2-BD59-A6C34878D82A}">
+                    <a16:rowId xmlns:a16="http://schemas.microsoft.com/office/drawing/2014/main" val="3629270950"/>
+                  </a:ext>
+                </a:extLst>
+              </a:tr>
+              <a:tr h="370840">
+                <a:tc>
+                  <a:txBody>
+                    <a:bodyPr/>
+                    <a:lstStyle/>
+                    <a:p>
+                      <a:r>
+                        <a:rPr lang="en-US" dirty="0"/>
+                        <a:t>6. Nation State, Country, Conglomerate</a:t>
+                      </a:r>
+                    </a:p>
+                  </a:txBody>
+                  <a:tcPr/>
+                </a:tc>
+                <a:tc>
+                  <a:txBody>
+                    <a:bodyPr/>
+                    <a:lstStyle/>
+                    <a:p>
+                      <a:r>
+                        <a:rPr lang="en-US" dirty="0"/>
+                        <a:t>Nation</a:t>
+                      </a:r>
+                    </a:p>
+                  </a:txBody>
+                  <a:tcPr/>
+                </a:tc>
+                <a:tc>
+                  <a:txBody>
+                    <a:bodyPr/>
+                    <a:lstStyle/>
+                    <a:p>
+                      <a:r>
+                        <a:rPr lang="en-US" dirty="0"/>
+                        <a:t>Common Knowledge</a:t>
+                      </a:r>
+                    </a:p>
+                  </a:txBody>
+                  <a:tcPr/>
+                </a:tc>
+                <a:extLst>
+                  <a:ext uri="{0D108BD9-81ED-4DB2-BD59-A6C34878D82A}">
+                    <a16:rowId xmlns:a16="http://schemas.microsoft.com/office/drawing/2014/main" val="3043198198"/>
+                  </a:ext>
+                </a:extLst>
+              </a:tr>
+              <a:tr h="370840">
+                <a:tc>
+                  <a:txBody>
+                    <a:bodyPr/>
+                    <a:lstStyle/>
+                    <a:p>
+                      <a:r>
+                        <a:rPr lang="en-US" dirty="0"/>
+                        <a:t>7. Global Co-operative of Nations (GCN)</a:t>
+                      </a:r>
+                    </a:p>
+                  </a:txBody>
+                  <a:tcPr/>
+                </a:tc>
+                <a:tc>
+                  <a:txBody>
+                    <a:bodyPr/>
+                    <a:lstStyle/>
+                    <a:p>
+                      <a:r>
+                        <a:rPr lang="en-US" dirty="0"/>
+                        <a:t>Global</a:t>
+                      </a:r>
+                    </a:p>
+                  </a:txBody>
+                  <a:tcPr/>
+                </a:tc>
+                <a:tc>
+                  <a:txBody>
+                    <a:bodyPr/>
+                    <a:lstStyle/>
+                    <a:p>
+                      <a:r>
+                        <a:rPr lang="en-US" dirty="0"/>
+                        <a:t>All Global Knowledge across All Languages and Repositories</a:t>
+                      </a:r>
+                    </a:p>
+                  </a:txBody>
+                  <a:tcPr/>
+                </a:tc>
+                <a:extLst>
+                  <a:ext uri="{0D108BD9-81ED-4DB2-BD59-A6C34878D82A}">
+                    <a16:rowId xmlns:a16="http://schemas.microsoft.com/office/drawing/2014/main" val="4129496115"/>
+                  </a:ext>
+                </a:extLst>
+              </a:tr>
+            </a:tbl>
+          </a:graphicData>
+        </a:graphic>
+      </p:graphicFrame>
+      <p:sp>
+        <p:nvSpPr>
+          <p:cNvPr id="5" name="TextBox 4">
+            <a:extLst>
+              <a:ext uri="{FF2B5EF4-FFF2-40B4-BE49-F238E27FC236}">
+                <a16:creationId xmlns:a16="http://schemas.microsoft.com/office/drawing/2014/main" id="{702BD321-2079-4E5B-9635-F29C03DCA741}"/>
+              </a:ext>
+            </a:extLst>
+          </p:cNvPr>
+          <p:cNvSpPr txBox="1"/>
+          <p:nvPr/>
+        </p:nvSpPr>
+        <p:spPr>
+          <a:xfrm>
+            <a:off x="914400" y="966587"/>
+            <a:ext cx="12801600" cy="645029"/>
+          </a:xfrm>
+          <a:prstGeom prst="rect">
+            <a:avLst/>
+          </a:prstGeom>
+          <a:noFill/>
+        </p:spPr>
+        <p:txBody>
+          <a:bodyPr wrap="square" rtlCol="0" anchor="ctr">
+            <a:noAutofit/>
+          </a:bodyPr>
+          <a:lstStyle>
+            <a:defPPr>
+              <a:defRPr lang="en-US"/>
+            </a:defPPr>
+            <a:lvl1pPr algn="ctr"/>
+          </a:lstStyle>
+          <a:p>
+            <a:pPr algn="l"/>
+            <a:r>
+              <a:rPr lang="en-US" sz="2400" dirty="0"/>
+              <a:t>Trusted Digital Web (TDW2022) Information  Scopes (based on Social Evolution Model) – 2202-01-23</a:t>
+            </a:r>
+          </a:p>
+        </p:txBody>
+      </p:sp>
+    </p:spTree>
+    <p:extLst>
+      <p:ext uri="{BB962C8B-B14F-4D97-AF65-F5344CB8AC3E}">
+        <p14:creationId xmlns:p14="http://schemas.microsoft.com/office/powerpoint/2010/main" val="3436519791"/>
       </p:ext>
     </p:extLst>
   </p:cSld>

</xml_diff>